<commit_message>
Added details about the cancellation model
</commit_message>
<xml_diff>
--- a/docs/Final Presentation_FlightDelay.pptx
+++ b/docs/Final Presentation_FlightDelay.pptx
@@ -125,7 +125,7 @@
   </p:defaultTextStyle>
   <p:extLst>
     <p:ext uri="{EFAFB233-063F-42B5-8137-9DF3F51BA10A}">
-      <p15:sldGuideLst xmlns:p15="http://schemas.microsoft.com/office/powerpoint/2012/main" xmlns="">
+      <p15:sldGuideLst xmlns:p15="http://schemas.microsoft.com/office/powerpoint/2012/main">
         <p15:guide id="1" orient="horz" pos="2160">
           <p15:clr>
             <a:srgbClr val="A4A3A4"/>
@@ -394,7 +394,7 @@
     </p:spTree>
     <p:extLst>
       <p:ext uri="{BB962C8B-B14F-4D97-AF65-F5344CB8AC3E}">
-        <p14:creationId xmlns:p14="http://schemas.microsoft.com/office/powerpoint/2010/main" xmlns="" val="1742341603"/>
+        <p14:creationId xmlns:p14="http://schemas.microsoft.com/office/powerpoint/2010/main" val="1742341603"/>
       </p:ext>
     </p:extLst>
   </p:cSld>
@@ -794,7 +794,7 @@
     </p:spTree>
     <p:extLst>
       <p:ext uri="{BB962C8B-B14F-4D97-AF65-F5344CB8AC3E}">
-        <p14:creationId xmlns:p14="http://schemas.microsoft.com/office/powerpoint/2010/main" xmlns="" val="3892923416"/>
+        <p14:creationId xmlns:p14="http://schemas.microsoft.com/office/powerpoint/2010/main" val="3892923416"/>
       </p:ext>
     </p:extLst>
   </p:cSld>
@@ -966,7 +966,7 @@
     </p:spTree>
     <p:extLst>
       <p:ext uri="{BB962C8B-B14F-4D97-AF65-F5344CB8AC3E}">
-        <p14:creationId xmlns:p14="http://schemas.microsoft.com/office/powerpoint/2010/main" xmlns="" val="906640776"/>
+        <p14:creationId xmlns:p14="http://schemas.microsoft.com/office/powerpoint/2010/main" val="906640776"/>
       </p:ext>
     </p:extLst>
   </p:cSld>
@@ -1148,7 +1148,7 @@
     </p:spTree>
     <p:extLst>
       <p:ext uri="{BB962C8B-B14F-4D97-AF65-F5344CB8AC3E}">
-        <p14:creationId xmlns:p14="http://schemas.microsoft.com/office/powerpoint/2010/main" xmlns="" val="3329541097"/>
+        <p14:creationId xmlns:p14="http://schemas.microsoft.com/office/powerpoint/2010/main" val="3329541097"/>
       </p:ext>
     </p:extLst>
   </p:cSld>
@@ -1320,7 +1320,7 @@
     </p:spTree>
     <p:extLst>
       <p:ext uri="{BB962C8B-B14F-4D97-AF65-F5344CB8AC3E}">
-        <p14:creationId xmlns:p14="http://schemas.microsoft.com/office/powerpoint/2010/main" xmlns="" val="391951291"/>
+        <p14:creationId xmlns:p14="http://schemas.microsoft.com/office/powerpoint/2010/main" val="391951291"/>
       </p:ext>
     </p:extLst>
   </p:cSld>
@@ -1608,7 +1608,7 @@
     </p:spTree>
     <p:extLst>
       <p:ext uri="{BB962C8B-B14F-4D97-AF65-F5344CB8AC3E}">
-        <p14:creationId xmlns:p14="http://schemas.microsoft.com/office/powerpoint/2010/main" xmlns="" val="1336318911"/>
+        <p14:creationId xmlns:p14="http://schemas.microsoft.com/office/powerpoint/2010/main" val="1336318911"/>
       </p:ext>
     </p:extLst>
   </p:cSld>
@@ -1898,7 +1898,7 @@
     </p:spTree>
     <p:extLst>
       <p:ext uri="{BB962C8B-B14F-4D97-AF65-F5344CB8AC3E}">
-        <p14:creationId xmlns:p14="http://schemas.microsoft.com/office/powerpoint/2010/main" xmlns="" val="232030402"/>
+        <p14:creationId xmlns:p14="http://schemas.microsoft.com/office/powerpoint/2010/main" val="232030402"/>
       </p:ext>
     </p:extLst>
   </p:cSld>
@@ -2324,7 +2324,7 @@
     </p:spTree>
     <p:extLst>
       <p:ext uri="{BB962C8B-B14F-4D97-AF65-F5344CB8AC3E}">
-        <p14:creationId xmlns:p14="http://schemas.microsoft.com/office/powerpoint/2010/main" xmlns="" val="3602337536"/>
+        <p14:creationId xmlns:p14="http://schemas.microsoft.com/office/powerpoint/2010/main" val="3602337536"/>
       </p:ext>
     </p:extLst>
   </p:cSld>
@@ -2444,7 +2444,7 @@
     </p:spTree>
     <p:extLst>
       <p:ext uri="{BB962C8B-B14F-4D97-AF65-F5344CB8AC3E}">
-        <p14:creationId xmlns:p14="http://schemas.microsoft.com/office/powerpoint/2010/main" xmlns="" val="1814451541"/>
+        <p14:creationId xmlns:p14="http://schemas.microsoft.com/office/powerpoint/2010/main" val="1814451541"/>
       </p:ext>
     </p:extLst>
   </p:cSld>
@@ -2541,7 +2541,7 @@
     </p:spTree>
     <p:extLst>
       <p:ext uri="{BB962C8B-B14F-4D97-AF65-F5344CB8AC3E}">
-        <p14:creationId xmlns:p14="http://schemas.microsoft.com/office/powerpoint/2010/main" xmlns="" val="1384430572"/>
+        <p14:creationId xmlns:p14="http://schemas.microsoft.com/office/powerpoint/2010/main" val="1384430572"/>
       </p:ext>
     </p:extLst>
   </p:cSld>
@@ -2833,7 +2833,7 @@
     </p:spTree>
     <p:extLst>
       <p:ext uri="{BB962C8B-B14F-4D97-AF65-F5344CB8AC3E}">
-        <p14:creationId xmlns:p14="http://schemas.microsoft.com/office/powerpoint/2010/main" xmlns="" val="1712562434"/>
+        <p14:creationId xmlns:p14="http://schemas.microsoft.com/office/powerpoint/2010/main" val="1712562434"/>
       </p:ext>
     </p:extLst>
   </p:cSld>
@@ -3107,7 +3107,7 @@
     </p:spTree>
     <p:extLst>
       <p:ext uri="{BB962C8B-B14F-4D97-AF65-F5344CB8AC3E}">
-        <p14:creationId xmlns:p14="http://schemas.microsoft.com/office/powerpoint/2010/main" xmlns="" val="342839541"/>
+        <p14:creationId xmlns:p14="http://schemas.microsoft.com/office/powerpoint/2010/main" val="342839541"/>
       </p:ext>
     </p:extLst>
   </p:cSld>
@@ -3394,7 +3394,7 @@
     </p:spTree>
     <p:extLst>
       <p:ext uri="{BB962C8B-B14F-4D97-AF65-F5344CB8AC3E}">
-        <p14:creationId xmlns:p14="http://schemas.microsoft.com/office/powerpoint/2010/main" xmlns="" val="2194205160"/>
+        <p14:creationId xmlns:p14="http://schemas.microsoft.com/office/powerpoint/2010/main" val="2194205160"/>
       </p:ext>
     </p:extLst>
   </p:cSld>
@@ -3864,7 +3864,7 @@
     </p:spTree>
     <p:extLst>
       <p:ext uri="{BB962C8B-B14F-4D97-AF65-F5344CB8AC3E}">
-        <p14:creationId xmlns:p14="http://schemas.microsoft.com/office/powerpoint/2010/main" xmlns="" val="227987809"/>
+        <p14:creationId xmlns:p14="http://schemas.microsoft.com/office/powerpoint/2010/main" val="227987809"/>
       </p:ext>
     </p:extLst>
   </p:cSld>
@@ -4020,7 +4020,7 @@
           <a:blip r:embed="rId2">
             <a:extLst>
               <a:ext uri="{28A0092B-C50C-407E-A947-70E740481C1C}">
-                <a14:useLocalDpi xmlns:a14="http://schemas.microsoft.com/office/drawing/2010/main" xmlns="" val="0"/>
+                <a14:useLocalDpi xmlns:a14="http://schemas.microsoft.com/office/drawing/2010/main" val="0"/>
               </a:ext>
             </a:extLst>
           </a:blip>
@@ -4041,7 +4041,7 @@
     </p:spTree>
     <p:extLst>
       <p:ext uri="{BB962C8B-B14F-4D97-AF65-F5344CB8AC3E}">
-        <p14:creationId xmlns:p14="http://schemas.microsoft.com/office/powerpoint/2010/main" xmlns="" val="2125225531"/>
+        <p14:creationId xmlns:p14="http://schemas.microsoft.com/office/powerpoint/2010/main" val="2125225531"/>
       </p:ext>
     </p:extLst>
   </p:cSld>
@@ -4115,7 +4115,7 @@
           <a:blip r:embed="rId2">
             <a:extLst>
               <a:ext uri="{28A0092B-C50C-407E-A947-70E740481C1C}">
-                <a14:useLocalDpi xmlns:a14="http://schemas.microsoft.com/office/drawing/2010/main" xmlns="" val="0"/>
+                <a14:useLocalDpi xmlns:a14="http://schemas.microsoft.com/office/drawing/2010/main" val="0"/>
               </a:ext>
             </a:extLst>
           </a:blip>
@@ -4136,7 +4136,7 @@
     </p:spTree>
     <p:extLst>
       <p:ext uri="{BB962C8B-B14F-4D97-AF65-F5344CB8AC3E}">
-        <p14:creationId xmlns:p14="http://schemas.microsoft.com/office/powerpoint/2010/main" xmlns="" val="1113911646"/>
+        <p14:creationId xmlns:p14="http://schemas.microsoft.com/office/powerpoint/2010/main" val="1113911646"/>
       </p:ext>
     </p:extLst>
   </p:cSld>
@@ -4280,7 +4280,7 @@
     </p:spTree>
     <p:extLst>
       <p:ext uri="{BB962C8B-B14F-4D97-AF65-F5344CB8AC3E}">
-        <p14:creationId xmlns:p14="http://schemas.microsoft.com/office/powerpoint/2010/main" xmlns="" val="464870505"/>
+        <p14:creationId xmlns:p14="http://schemas.microsoft.com/office/powerpoint/2010/main" val="464870505"/>
       </p:ext>
     </p:extLst>
   </p:cSld>
@@ -4408,15 +4408,7 @@
             <a:pPr lvl="2"/>
             <a:r>
               <a:rPr lang="en-US" dirty="0" smtClean="0"/>
-              <a:t>Output Layer: </a:t>
-            </a:r>
-            <a:r>
-              <a:rPr lang="en-US" dirty="0" smtClean="0"/>
-              <a:t>2 </a:t>
-            </a:r>
-            <a:r>
-              <a:rPr lang="en-US" dirty="0" smtClean="0"/>
-              <a:t>nodes</a:t>
+              <a:t>Output Layer: 2 nodes</a:t>
             </a:r>
           </a:p>
           <a:p>
@@ -4430,7 +4422,7 @@
     </p:spTree>
     <p:extLst>
       <p:ext uri="{BB962C8B-B14F-4D97-AF65-F5344CB8AC3E}">
-        <p14:creationId xmlns:p14="http://schemas.microsoft.com/office/powerpoint/2010/main" xmlns="" val="36574912"/>
+        <p14:creationId xmlns:p14="http://schemas.microsoft.com/office/powerpoint/2010/main" val="36574912"/>
       </p:ext>
     </p:extLst>
   </p:cSld>
@@ -4523,11 +4515,7 @@
           <a:p>
             <a:r>
               <a:rPr lang="en-US" sz="2400" dirty="0" smtClean="0"/>
-              <a:t>Delay  &lt; 5 minutes – not </a:t>
-            </a:r>
-            <a:r>
-              <a:rPr lang="en-US" sz="2400" dirty="0" smtClean="0"/>
-              <a:t>delayed</a:t>
+              <a:t>Delay  &lt; 5 minutes – not delayed</a:t>
             </a:r>
           </a:p>
           <a:p>
@@ -4541,7 +4529,7 @@
     </p:spTree>
     <p:extLst>
       <p:ext uri="{BB962C8B-B14F-4D97-AF65-F5344CB8AC3E}">
-        <p14:creationId xmlns:p14="http://schemas.microsoft.com/office/powerpoint/2010/main" xmlns="" val="1938473595"/>
+        <p14:creationId xmlns:p14="http://schemas.microsoft.com/office/powerpoint/2010/main" val="1938473595"/>
       </p:ext>
     </p:extLst>
   </p:cSld>
@@ -4611,12 +4599,12 @@
         <p:spPr>
           <a:xfrm>
             <a:off x="1143000" y="1965960"/>
-            <a:ext cx="10058400" cy="3280954"/>
+            <a:ext cx="10058400" cy="4059936"/>
           </a:xfrm>
         </p:spPr>
         <p:txBody>
           <a:bodyPr>
-            <a:normAutofit lnSpcReduction="10000"/>
+            <a:normAutofit/>
           </a:bodyPr>
           <a:lstStyle/>
           <a:p>
@@ -4652,11 +4640,7 @@
             </a:r>
             <a:r>
               <a:rPr lang="en-US" sz="2800" dirty="0" smtClean="0"/>
-              <a:t>predictive </a:t>
-            </a:r>
-            <a:r>
-              <a:rPr lang="en-US" sz="2800" dirty="0" smtClean="0"/>
-              <a:t>model</a:t>
+              <a:t>predictive model</a:t>
             </a:r>
           </a:p>
           <a:p>
@@ -4672,7 +4656,27 @@
             </a:pPr>
             <a:r>
               <a:rPr lang="en-US" sz="2400" dirty="0" smtClean="0"/>
-              <a:t>Achieved accuracy of 67 % in prediction</a:t>
+              <a:t>Achieved accuracy of 67 % in </a:t>
+            </a:r>
+            <a:r>
+              <a:rPr lang="en-US" sz="2400" dirty="0" smtClean="0"/>
+              <a:t>prediction in prediction of flight delay</a:t>
+            </a:r>
+          </a:p>
+          <a:p>
+            <a:pPr marL="834390" lvl="3">
+              <a:spcBef>
+                <a:spcPts val="0"/>
+              </a:spcBef>
+              <a:spcAft>
+                <a:spcPts val="0"/>
+              </a:spcAft>
+              <a:buClrTx/>
+              <a:buSzTx/>
+            </a:pPr>
+            <a:r>
+              <a:rPr lang="en-US" sz="2400" dirty="0" smtClean="0"/>
+              <a:t>Achieved accuracy of 98% in prediction of flight cancellations</a:t>
             </a:r>
             <a:endParaRPr lang="en-US" sz="2400" dirty="0" smtClean="0"/>
           </a:p>
@@ -4731,7 +4735,15 @@
             </a:pPr>
             <a:r>
               <a:rPr lang="en-US" sz="2200" dirty="0"/>
-              <a:t>% chance of  </a:t>
+              <a:t>C</a:t>
+            </a:r>
+            <a:r>
+              <a:rPr lang="en-US" sz="2200" dirty="0" smtClean="0"/>
+              <a:t>hance </a:t>
+            </a:r>
+            <a:r>
+              <a:rPr lang="en-US" sz="2200" dirty="0"/>
+              <a:t>of  </a:t>
             </a:r>
             <a:r>
               <a:rPr lang="en-US" sz="2200" dirty="0" smtClean="0"/>
@@ -4751,19 +4763,9 @@
             </a:pPr>
             <a:r>
               <a:rPr lang="en-US" sz="2000" dirty="0" smtClean="0"/>
-              <a:t>Did not have time to run that part of the model </a:t>
-            </a:r>
-            <a:r>
-              <a:rPr lang="en-US" sz="2000" dirty="0" smtClean="0">
-                <a:sym typeface="Wingdings" pitchFamily="2" charset="2"/>
-              </a:rPr>
-              <a:t></a:t>
-            </a:r>
-            <a:r>
-              <a:rPr lang="en-US" sz="2000" dirty="0" smtClean="0"/>
-              <a:t> </a:t>
-            </a:r>
-            <a:endParaRPr lang="en-US" sz="2000" dirty="0"/>
+              <a:t>Predicts if the flight will get cancelled</a:t>
+            </a:r>
+            <a:endParaRPr lang="en-US" sz="2000" dirty="0" smtClean="0"/>
           </a:p>
           <a:p>
             <a:pPr marL="742950" lvl="2">
@@ -4802,12 +4804,8 @@
               <a:buSzTx/>
             </a:pPr>
             <a:r>
-              <a:rPr lang="en-US" sz="2000" smtClean="0"/>
-              <a:t>Predicts chance </a:t>
-            </a:r>
-            <a:r>
               <a:rPr lang="en-US" sz="2000" dirty="0" smtClean="0"/>
-              <a:t>of delay over 5 minutes </a:t>
+              <a:t>Predicts chance of delay over 5 minutes </a:t>
             </a:r>
             <a:r>
               <a:rPr lang="en-US" sz="2000" dirty="0" smtClean="0">
@@ -4822,7 +4820,7 @@
     </p:spTree>
     <p:extLst>
       <p:ext uri="{BB962C8B-B14F-4D97-AF65-F5344CB8AC3E}">
-        <p14:creationId xmlns:p14="http://schemas.microsoft.com/office/powerpoint/2010/main" xmlns="" val="311230753"/>
+        <p14:creationId xmlns:p14="http://schemas.microsoft.com/office/powerpoint/2010/main" val="311230753"/>
       </p:ext>
     </p:extLst>
   </p:cSld>
@@ -4896,7 +4894,17 @@
           <a:p>
             <a:r>
               <a:rPr lang="en-US" dirty="0" smtClean="0"/>
-              <a:t>For any given flight, delay information is obtained with an accuracy of 67%</a:t>
+              <a:t>For any given flight, delay information is obtained with an accuracy of 67</a:t>
+            </a:r>
+            <a:r>
+              <a:rPr lang="en-US" dirty="0" smtClean="0"/>
+              <a:t>%</a:t>
+            </a:r>
+          </a:p>
+          <a:p>
+            <a:r>
+              <a:rPr lang="en-US" dirty="0" smtClean="0"/>
+              <a:t>For any given flight, predicts if the flight will get cancelled with an accuracy of 98%</a:t>
             </a:r>
             <a:endParaRPr lang="en-US" dirty="0"/>
           </a:p>
@@ -4905,7 +4913,7 @@
     </p:spTree>
     <p:extLst>
       <p:ext uri="{BB962C8B-B14F-4D97-AF65-F5344CB8AC3E}">
-        <p14:creationId xmlns:p14="http://schemas.microsoft.com/office/powerpoint/2010/main" xmlns="" val="270160240"/>
+        <p14:creationId xmlns:p14="http://schemas.microsoft.com/office/powerpoint/2010/main" val="270160240"/>
       </p:ext>
     </p:extLst>
   </p:cSld>
@@ -4963,7 +4971,7 @@
     </p:spTree>
     <p:extLst>
       <p:ext uri="{BB962C8B-B14F-4D97-AF65-F5344CB8AC3E}">
-        <p14:creationId xmlns:p14="http://schemas.microsoft.com/office/powerpoint/2010/main" xmlns="" val="1421260223"/>
+        <p14:creationId xmlns:p14="http://schemas.microsoft.com/office/powerpoint/2010/main" val="1421260223"/>
       </p:ext>
     </p:extLst>
   </p:cSld>
@@ -5091,7 +5099,7 @@
     </p:spTree>
     <p:extLst>
       <p:ext uri="{BB962C8B-B14F-4D97-AF65-F5344CB8AC3E}">
-        <p14:creationId xmlns:p14="http://schemas.microsoft.com/office/powerpoint/2010/main" xmlns="" val="401529231"/>
+        <p14:creationId xmlns:p14="http://schemas.microsoft.com/office/powerpoint/2010/main" val="401529231"/>
       </p:ext>
     </p:extLst>
   </p:cSld>
@@ -5233,7 +5241,7 @@
                   <a:blip r:embed="rId2">
                     <a:extLst>
                       <a:ext uri="{28A0092B-C50C-407E-A947-70E740481C1C}">
-                        <a14:useLocalDpi xmlns:a14="http://schemas.microsoft.com/office/drawing/2010/main" xmlns="" val="0"/>
+                        <a14:useLocalDpi xmlns:a14="http://schemas.microsoft.com/office/drawing/2010/main" val="0"/>
                       </a:ext>
                     </a:extLst>
                   </a:blip>
@@ -5257,7 +5265,7 @@
     </p:spTree>
     <p:extLst>
       <p:ext uri="{BB962C8B-B14F-4D97-AF65-F5344CB8AC3E}">
-        <p14:creationId xmlns:p14="http://schemas.microsoft.com/office/powerpoint/2010/main" xmlns="" val="1350056412"/>
+        <p14:creationId xmlns:p14="http://schemas.microsoft.com/office/powerpoint/2010/main" val="1350056412"/>
       </p:ext>
     </p:extLst>
   </p:cSld>
@@ -5398,7 +5406,7 @@
     </p:spTree>
     <p:extLst>
       <p:ext uri="{BB962C8B-B14F-4D97-AF65-F5344CB8AC3E}">
-        <p14:creationId xmlns:p14="http://schemas.microsoft.com/office/powerpoint/2010/main" xmlns="" val="233496756"/>
+        <p14:creationId xmlns:p14="http://schemas.microsoft.com/office/powerpoint/2010/main" val="233496756"/>
       </p:ext>
     </p:extLst>
   </p:cSld>
@@ -5483,11 +5491,7 @@
             <a:pPr lvl="1"/>
             <a:r>
               <a:rPr lang="en-US" dirty="0" smtClean="0"/>
-              <a:t>Encoded for string values using one-hot </a:t>
-            </a:r>
-            <a:r>
-              <a:rPr lang="en-US" dirty="0" smtClean="0"/>
-              <a:t>encoding</a:t>
+              <a:t>Encoded for string values using one-hot encoding</a:t>
             </a:r>
             <a:endParaRPr lang="en-US" dirty="0"/>
           </a:p>
@@ -5637,7 +5641,7 @@
     </p:spTree>
     <p:extLst>
       <p:ext uri="{BB962C8B-B14F-4D97-AF65-F5344CB8AC3E}">
-        <p14:creationId xmlns:p14="http://schemas.microsoft.com/office/powerpoint/2010/main" xmlns="" val="1366350129"/>
+        <p14:creationId xmlns:p14="http://schemas.microsoft.com/office/powerpoint/2010/main" val="1366350129"/>
       </p:ext>
     </p:extLst>
   </p:cSld>
@@ -5780,7 +5784,7 @@
           <a:blip r:embed="rId2">
             <a:extLst>
               <a:ext uri="{28A0092B-C50C-407E-A947-70E740481C1C}">
-                <a14:useLocalDpi xmlns:a14="http://schemas.microsoft.com/office/drawing/2010/main" xmlns="" val="0"/>
+                <a14:useLocalDpi xmlns:a14="http://schemas.microsoft.com/office/drawing/2010/main" val="0"/>
               </a:ext>
             </a:extLst>
           </a:blip>
@@ -5801,7 +5805,7 @@
     </p:spTree>
     <p:extLst>
       <p:ext uri="{BB962C8B-B14F-4D97-AF65-F5344CB8AC3E}">
-        <p14:creationId xmlns:p14="http://schemas.microsoft.com/office/powerpoint/2010/main" xmlns="" val="36797345"/>
+        <p14:creationId xmlns:p14="http://schemas.microsoft.com/office/powerpoint/2010/main" val="36797345"/>
       </p:ext>
     </p:extLst>
   </p:cSld>
@@ -5939,7 +5943,7 @@
     </p:spTree>
     <p:extLst>
       <p:ext uri="{BB962C8B-B14F-4D97-AF65-F5344CB8AC3E}">
-        <p14:creationId xmlns:p14="http://schemas.microsoft.com/office/powerpoint/2010/main" xmlns="" val="448311129"/>
+        <p14:creationId xmlns:p14="http://schemas.microsoft.com/office/powerpoint/2010/main" val="448311129"/>
       </p:ext>
     </p:extLst>
   </p:cSld>
@@ -6100,7 +6104,7 @@
     </p:spTree>
     <p:extLst>
       <p:ext uri="{BB962C8B-B14F-4D97-AF65-F5344CB8AC3E}">
-        <p14:creationId xmlns:p14="http://schemas.microsoft.com/office/powerpoint/2010/main" xmlns="" val="1541137502"/>
+        <p14:creationId xmlns:p14="http://schemas.microsoft.com/office/powerpoint/2010/main" val="1541137502"/>
       </p:ext>
     </p:extLst>
   </p:cSld>
@@ -6295,7 +6299,7 @@
     </p:spTree>
     <p:extLst>
       <p:ext uri="{BB962C8B-B14F-4D97-AF65-F5344CB8AC3E}">
-        <p14:creationId xmlns:p14="http://schemas.microsoft.com/office/powerpoint/2010/main" xmlns="" val="1581306419"/>
+        <p14:creationId xmlns:p14="http://schemas.microsoft.com/office/powerpoint/2010/main" val="1581306419"/>
       </p:ext>
     </p:extLst>
   </p:cSld>
@@ -6543,7 +6547,7 @@
   <a:extraClrSchemeLst/>
   <a:extLst>
     <a:ext uri="{05A4C25C-085E-4340-85A3-A5531E510DB2}">
-      <thm15:themeFamily xmlns:thm15="http://schemas.microsoft.com/office/thememl/2012/main" xmlns="" name="Basis" id="{5665723A-49BA-4B57-8411-A56F8F207965}" vid="{ACC63D00-1EE0-4159-BF5A-6FF02000B710}"/>
+      <thm15:themeFamily xmlns:thm15="http://schemas.microsoft.com/office/thememl/2012/main" name="Basis" id="{5665723A-49BA-4B57-8411-A56F8F207965}" vid="{ACC63D00-1EE0-4159-BF5A-6FF02000B710}"/>
     </a:ext>
   </a:extLst>
 </a:theme>
@@ -6804,7 +6808,7 @@
   <a:extraClrSchemeLst/>
   <a:extLst>
     <a:ext uri="{05A4C25C-085E-4340-85A3-A5531E510DB2}">
-      <thm15:themeFamily xmlns:thm15="http://schemas.microsoft.com/office/thememl/2012/main" xmlns="" name="Office Theme" id="{62F939B6-93AF-4DB8-9C6B-D6C7DFDC589F}" vid="{4A3C46E8-61CC-4603-A589-7422A47A8E4A}"/>
+      <thm15:themeFamily xmlns:thm15="http://schemas.microsoft.com/office/thememl/2012/main" name="Office Theme" id="{62F939B6-93AF-4DB8-9C6B-D6C7DFDC589F}" vid="{4A3C46E8-61CC-4603-A589-7422A47A8E4A}"/>
     </a:ext>
   </a:extLst>
 </a:theme>

</xml_diff>